<commit_message>
Variety of changes to main firmware
</commit_message>
<xml_diff>
--- a/ECAD/Shematic.pptx
+++ b/ECAD/Shematic.pptx
@@ -122,7 +122,7 @@
 <file path=ppt/revisionInfo.xml><?xml version="1.0" encoding="utf-8"?>
 <p1510:revInfo xmlns:a="http://schemas.openxmlformats.org/drawingml/2006/main" xmlns:r="http://schemas.openxmlformats.org/officeDocument/2006/relationships" xmlns:p1510="http://schemas.microsoft.com/office/powerpoint/2015/10/main">
   <p1510:revLst>
-    <p1510:client id="{C51E0E16-75F0-409E-8908-12C52B154A5F}" v="11" dt="2025-07-03T22:00:28.296"/>
+    <p1510:client id="{D28BF94E-B6D5-49E1-9449-6C50EA865A85}" v="6" dt="2025-07-23T22:04:04.307"/>
   </p1510:revLst>
 </p1510:revInfo>
 </file>
@@ -2767,6 +2767,94 @@
       </pc:sldChg>
     </pc:docChg>
   </pc:docChgLst>
+  <pc:docChgLst>
+    <pc:chgData name="Jan K" userId="d066db4a5de46abf" providerId="LiveId" clId="{D28BF94E-B6D5-49E1-9449-6C50EA865A85}"/>
+    <pc:docChg chg="undo custSel modSld">
+      <pc:chgData name="Jan K" userId="d066db4a5de46abf" providerId="LiveId" clId="{D28BF94E-B6D5-49E1-9449-6C50EA865A85}" dt="2025-07-23T22:04:37.642" v="62" actId="1076"/>
+      <pc:docMkLst>
+        <pc:docMk/>
+      </pc:docMkLst>
+      <pc:sldChg chg="addSp modSp mod">
+        <pc:chgData name="Jan K" userId="d066db4a5de46abf" providerId="LiveId" clId="{D28BF94E-B6D5-49E1-9449-6C50EA865A85}" dt="2025-07-23T22:04:37.642" v="62" actId="1076"/>
+        <pc:sldMkLst>
+          <pc:docMk/>
+          <pc:sldMk cId="882265010" sldId="287"/>
+        </pc:sldMkLst>
+        <pc:spChg chg="mod">
+          <ac:chgData name="Jan K" userId="d066db4a5de46abf" providerId="LiveId" clId="{D28BF94E-B6D5-49E1-9449-6C50EA865A85}" dt="2025-07-23T22:04:01.305" v="46" actId="14100"/>
+          <ac:spMkLst>
+            <pc:docMk/>
+            <pc:sldMk cId="882265010" sldId="287"/>
+            <ac:spMk id="4" creationId="{D588DFE0-4FB9-F8D4-32CF-CBAB3BDE271C}"/>
+          </ac:spMkLst>
+        </pc:spChg>
+        <pc:spChg chg="mod">
+          <ac:chgData name="Jan K" userId="d066db4a5de46abf" providerId="LiveId" clId="{D28BF94E-B6D5-49E1-9449-6C50EA865A85}" dt="2025-07-23T21:42:42.122" v="43" actId="1076"/>
+          <ac:spMkLst>
+            <pc:docMk/>
+            <pc:sldMk cId="882265010" sldId="287"/>
+            <ac:spMk id="5" creationId="{A172594B-5F4B-46D5-0B07-A93AD0A5ACE8}"/>
+          </ac:spMkLst>
+        </pc:spChg>
+        <pc:spChg chg="mod">
+          <ac:chgData name="Jan K" userId="d066db4a5de46abf" providerId="LiveId" clId="{D28BF94E-B6D5-49E1-9449-6C50EA865A85}" dt="2025-07-23T22:04:14.503" v="51" actId="1076"/>
+          <ac:spMkLst>
+            <pc:docMk/>
+            <pc:sldMk cId="882265010" sldId="287"/>
+            <ac:spMk id="6" creationId="{9F84748A-5999-7088-8F60-578213BA9B1D}"/>
+          </ac:spMkLst>
+        </pc:spChg>
+        <pc:spChg chg="add mod">
+          <ac:chgData name="Jan K" userId="d066db4a5de46abf" providerId="LiveId" clId="{D28BF94E-B6D5-49E1-9449-6C50EA865A85}" dt="2025-07-23T22:04:17.130" v="52" actId="1076"/>
+          <ac:spMkLst>
+            <pc:docMk/>
+            <pc:sldMk cId="882265010" sldId="287"/>
+            <ac:spMk id="9" creationId="{1E35098B-17BB-097A-EBE7-02C7EEB88B99}"/>
+          </ac:spMkLst>
+        </pc:spChg>
+        <pc:spChg chg="add mod">
+          <ac:chgData name="Jan K" userId="d066db4a5de46abf" providerId="LiveId" clId="{D28BF94E-B6D5-49E1-9449-6C50EA865A85}" dt="2025-07-22T09:27:02.091" v="17" actId="1076"/>
+          <ac:spMkLst>
+            <pc:docMk/>
+            <pc:sldMk cId="882265010" sldId="287"/>
+            <ac:spMk id="10" creationId="{93446F3A-9A7B-0BFC-121E-F0EB0355D2B1}"/>
+          </ac:spMkLst>
+        </pc:spChg>
+        <pc:spChg chg="add mod">
+          <ac:chgData name="Jan K" userId="d066db4a5de46abf" providerId="LiveId" clId="{D28BF94E-B6D5-49E1-9449-6C50EA865A85}" dt="2025-07-22T09:26:59.604" v="16" actId="1076"/>
+          <ac:spMkLst>
+            <pc:docMk/>
+            <pc:sldMk cId="882265010" sldId="287"/>
+            <ac:spMk id="11" creationId="{2AFAF8FD-E195-29F4-B71D-4A173D6F1C7A}"/>
+          </ac:spMkLst>
+        </pc:spChg>
+        <pc:spChg chg="add mod">
+          <ac:chgData name="Jan K" userId="d066db4a5de46abf" providerId="LiveId" clId="{D28BF94E-B6D5-49E1-9449-6C50EA865A85}" dt="2025-07-22T09:26:54.468" v="15" actId="1076"/>
+          <ac:spMkLst>
+            <pc:docMk/>
+            <pc:sldMk cId="882265010" sldId="287"/>
+            <ac:spMk id="12" creationId="{51A5DD59-78F1-A5CB-15EF-21C358083E45}"/>
+          </ac:spMkLst>
+        </pc:spChg>
+        <pc:spChg chg="add mod">
+          <ac:chgData name="Jan K" userId="d066db4a5de46abf" providerId="LiveId" clId="{D28BF94E-B6D5-49E1-9449-6C50EA865A85}" dt="2025-07-23T22:04:37.642" v="62" actId="1076"/>
+          <ac:spMkLst>
+            <pc:docMk/>
+            <pc:sldMk cId="882265010" sldId="287"/>
+            <ac:spMk id="13" creationId="{856BAAFB-D881-9361-090C-581BE223F77D}"/>
+          </ac:spMkLst>
+        </pc:spChg>
+        <pc:spChg chg="add mod">
+          <ac:chgData name="Jan K" userId="d066db4a5de46abf" providerId="LiveId" clId="{D28BF94E-B6D5-49E1-9449-6C50EA865A85}" dt="2025-07-23T22:04:35.787" v="61" actId="14100"/>
+          <ac:spMkLst>
+            <pc:docMk/>
+            <pc:sldMk cId="882265010" sldId="287"/>
+            <ac:spMk id="14" creationId="{09AD8F09-64DE-5A42-164C-05FB572040F2}"/>
+          </ac:spMkLst>
+        </pc:spChg>
+      </pc:sldChg>
+    </pc:docChg>
+  </pc:docChgLst>
 </pc:chgInfo>
 </file>
 
@@ -2852,7 +2940,7 @@
           <a:p>
             <a:fld id="{6A60FB70-4477-4AB3-9888-A31104B7E1BE}" type="datetimeFigureOut">
               <a:rPr lang="en-US" smtClean="0"/>
-              <a:t>7/3/2025</a:t>
+              <a:t>7/24/2025</a:t>
             </a:fld>
             <a:endParaRPr lang="en-US"/>
           </a:p>
@@ -4081,7 +4169,7 @@
           <a:p>
             <a:fld id="{FA078936-32F4-4A2C-8CD4-8C02C956183F}" type="datetimeFigureOut">
               <a:rPr lang="en-DE" smtClean="0"/>
-              <a:t>07/03/2025</a:t>
+              <a:t>07/24/2025</a:t>
             </a:fld>
             <a:endParaRPr lang="en-DE"/>
           </a:p>
@@ -4272,7 +4360,7 @@
           <a:p>
             <a:fld id="{FA078936-32F4-4A2C-8CD4-8C02C956183F}" type="datetimeFigureOut">
               <a:rPr lang="en-DE" smtClean="0"/>
-              <a:t>07/03/2025</a:t>
+              <a:t>07/24/2025</a:t>
             </a:fld>
             <a:endParaRPr lang="en-DE"/>
           </a:p>
@@ -7112,7 +7200,7 @@
           <a:p>
             <a:fld id="{FA078936-32F4-4A2C-8CD4-8C02C956183F}" type="datetimeFigureOut">
               <a:rPr lang="en-DE" smtClean="0"/>
-              <a:t>07/03/2025</a:t>
+              <a:t>07/24/2025</a:t>
             </a:fld>
             <a:endParaRPr lang="en-DE"/>
           </a:p>
@@ -7402,7 +7490,7 @@
           <a:p>
             <a:fld id="{FA078936-32F4-4A2C-8CD4-8C02C956183F}" type="datetimeFigureOut">
               <a:rPr lang="en-DE" smtClean="0"/>
-              <a:t>07/03/2025</a:t>
+              <a:t>07/24/2025</a:t>
             </a:fld>
             <a:endParaRPr lang="en-DE"/>
           </a:p>
@@ -7800,7 +7888,7 @@
           <a:p>
             <a:fld id="{FA078936-32F4-4A2C-8CD4-8C02C956183F}" type="datetimeFigureOut">
               <a:rPr lang="en-DE" smtClean="0"/>
-              <a:t>07/03/2025</a:t>
+              <a:t>07/24/2025</a:t>
             </a:fld>
             <a:endParaRPr lang="en-DE"/>
           </a:p>
@@ -9739,8 +9827,8 @@
         </p:nvSpPr>
         <p:spPr>
           <a:xfrm>
-            <a:off x="9624767" y="3940405"/>
-            <a:ext cx="1310326" cy="592317"/>
+            <a:off x="1506971" y="4685121"/>
+            <a:ext cx="1310326" cy="400641"/>
           </a:xfrm>
           <a:prstGeom prst="rect">
             <a:avLst/>
@@ -9786,7 +9874,15 @@
             </a:pPr>
             <a:r>
               <a:rPr lang="en-US" sz="1400" dirty="0"/>
-              <a:t>Rotary Encoder + SW</a:t>
+              <a:t>Rotary </a:t>
+            </a:r>
+            <a:r>
+              <a:rPr lang="en-US" sz="1400" dirty="0" err="1"/>
+              <a:t>sw</a:t>
+            </a:r>
+            <a:r>
+              <a:rPr lang="en-US" sz="1400" dirty="0"/>
+              <a:t> Encoder + SW</a:t>
             </a:r>
           </a:p>
         </p:txBody>
@@ -9805,7 +9901,7 @@
         </p:nvSpPr>
         <p:spPr>
           <a:xfrm>
-            <a:off x="1506971" y="3742443"/>
+            <a:off x="5721783" y="3130386"/>
             <a:ext cx="1310326" cy="762784"/>
           </a:xfrm>
           <a:prstGeom prst="rect">
@@ -9871,7 +9967,7 @@
         </p:nvSpPr>
         <p:spPr>
           <a:xfrm>
-            <a:off x="9624767" y="3429000"/>
+            <a:off x="9624767" y="3371255"/>
             <a:ext cx="1310326" cy="182249"/>
           </a:xfrm>
           <a:prstGeom prst="rect">
@@ -10003,6 +10099,392 @@
             <a:r>
               <a:rPr lang="en-US" sz="1600" dirty="0"/>
               <a:t>Raspberry Pi Pico</a:t>
+            </a:r>
+          </a:p>
+        </p:txBody>
+      </p:sp>
+      <p:sp>
+        <p:nvSpPr>
+          <p:cNvPr id="9" name="Rectangle 8">
+            <a:extLst>
+              <a:ext uri="{FF2B5EF4-FFF2-40B4-BE49-F238E27FC236}">
+                <a16:creationId xmlns:a16="http://schemas.microsoft.com/office/drawing/2014/main" id="{1E35098B-17BB-097A-EBE7-02C7EEB88B99}"/>
+              </a:ext>
+            </a:extLst>
+          </p:cNvPr>
+          <p:cNvSpPr/>
+          <p:nvPr/>
+        </p:nvSpPr>
+        <p:spPr>
+          <a:xfrm>
+            <a:off x="9624767" y="3698366"/>
+            <a:ext cx="1310326" cy="182249"/>
+          </a:xfrm>
+          <a:prstGeom prst="rect">
+            <a:avLst/>
+          </a:prstGeom>
+          <a:solidFill>
+            <a:schemeClr val="accent4"/>
+          </a:solidFill>
+          <a:ln>
+            <a:noFill/>
+          </a:ln>
+        </p:spPr>
+        <p:style>
+          <a:lnRef idx="2">
+            <a:schemeClr val="accent1">
+              <a:shade val="50000"/>
+            </a:schemeClr>
+          </a:lnRef>
+          <a:fillRef idx="1">
+            <a:schemeClr val="accent1"/>
+          </a:fillRef>
+          <a:effectRef idx="0">
+            <a:schemeClr val="accent1"/>
+          </a:effectRef>
+          <a:fontRef idx="minor">
+            <a:schemeClr val="lt1"/>
+          </a:fontRef>
+        </p:style>
+        <p:txBody>
+          <a:bodyPr rot="0" spcFirstLastPara="0" vertOverflow="overflow" horzOverflow="overflow" vert="horz" wrap="square" lIns="72000" tIns="72000" rIns="72000" bIns="72000" numCol="1" spcCol="0" rtlCol="0" fromWordArt="0" anchor="ctr" anchorCtr="0" forceAA="0" compatLnSpc="1">
+            <a:prstTxWarp prst="textNoShape">
+              <a:avLst/>
+            </a:prstTxWarp>
+            <a:noAutofit/>
+          </a:bodyPr>
+          <a:lstStyle/>
+          <a:p>
+            <a:pPr algn="ctr">
+              <a:spcBef>
+                <a:spcPts val="200"/>
+              </a:spcBef>
+            </a:pPr>
+            <a:r>
+              <a:rPr lang="en-US" sz="1400" dirty="0"/>
+              <a:t>Sw1</a:t>
+            </a:r>
+          </a:p>
+        </p:txBody>
+      </p:sp>
+      <p:sp>
+        <p:nvSpPr>
+          <p:cNvPr id="10" name="Rectangle 9">
+            <a:extLst>
+              <a:ext uri="{FF2B5EF4-FFF2-40B4-BE49-F238E27FC236}">
+                <a16:creationId xmlns:a16="http://schemas.microsoft.com/office/drawing/2014/main" id="{93446F3A-9A7B-0BFC-121E-F0EB0355D2B1}"/>
+              </a:ext>
+            </a:extLst>
+          </p:cNvPr>
+          <p:cNvSpPr/>
+          <p:nvPr/>
+        </p:nvSpPr>
+        <p:spPr>
+          <a:xfrm>
+            <a:off x="9624767" y="3031109"/>
+            <a:ext cx="1310326" cy="182249"/>
+          </a:xfrm>
+          <a:prstGeom prst="rect">
+            <a:avLst/>
+          </a:prstGeom>
+          <a:solidFill>
+            <a:schemeClr val="accent4"/>
+          </a:solidFill>
+          <a:ln>
+            <a:noFill/>
+          </a:ln>
+        </p:spPr>
+        <p:style>
+          <a:lnRef idx="2">
+            <a:schemeClr val="accent1">
+              <a:shade val="50000"/>
+            </a:schemeClr>
+          </a:lnRef>
+          <a:fillRef idx="1">
+            <a:schemeClr val="accent1"/>
+          </a:fillRef>
+          <a:effectRef idx="0">
+            <a:schemeClr val="accent1"/>
+          </a:effectRef>
+          <a:fontRef idx="minor">
+            <a:schemeClr val="lt1"/>
+          </a:fontRef>
+        </p:style>
+        <p:txBody>
+          <a:bodyPr rot="0" spcFirstLastPara="0" vertOverflow="overflow" horzOverflow="overflow" vert="horz" wrap="square" lIns="72000" tIns="72000" rIns="72000" bIns="72000" numCol="1" spcCol="0" rtlCol="0" fromWordArt="0" anchor="ctr" anchorCtr="0" forceAA="0" compatLnSpc="1">
+            <a:prstTxWarp prst="textNoShape">
+              <a:avLst/>
+            </a:prstTxWarp>
+            <a:noAutofit/>
+          </a:bodyPr>
+          <a:lstStyle/>
+          <a:p>
+            <a:pPr algn="ctr">
+              <a:spcBef>
+                <a:spcPts val="200"/>
+              </a:spcBef>
+            </a:pPr>
+            <a:r>
+              <a:rPr lang="en-US" sz="1400" dirty="0"/>
+              <a:t>Sw2</a:t>
+            </a:r>
+          </a:p>
+        </p:txBody>
+      </p:sp>
+      <p:sp>
+        <p:nvSpPr>
+          <p:cNvPr id="11" name="Rectangle 10">
+            <a:extLst>
+              <a:ext uri="{FF2B5EF4-FFF2-40B4-BE49-F238E27FC236}">
+                <a16:creationId xmlns:a16="http://schemas.microsoft.com/office/drawing/2014/main" id="{2AFAF8FD-E195-29F4-B71D-4A173D6F1C7A}"/>
+              </a:ext>
+            </a:extLst>
+          </p:cNvPr>
+          <p:cNvSpPr/>
+          <p:nvPr/>
+        </p:nvSpPr>
+        <p:spPr>
+          <a:xfrm>
+            <a:off x="9624767" y="2848860"/>
+            <a:ext cx="1310326" cy="182249"/>
+          </a:xfrm>
+          <a:prstGeom prst="rect">
+            <a:avLst/>
+          </a:prstGeom>
+          <a:solidFill>
+            <a:schemeClr val="accent4"/>
+          </a:solidFill>
+          <a:ln>
+            <a:noFill/>
+          </a:ln>
+        </p:spPr>
+        <p:style>
+          <a:lnRef idx="2">
+            <a:schemeClr val="accent1">
+              <a:shade val="50000"/>
+            </a:schemeClr>
+          </a:lnRef>
+          <a:fillRef idx="1">
+            <a:schemeClr val="accent1"/>
+          </a:fillRef>
+          <a:effectRef idx="0">
+            <a:schemeClr val="accent1"/>
+          </a:effectRef>
+          <a:fontRef idx="minor">
+            <a:schemeClr val="lt1"/>
+          </a:fontRef>
+        </p:style>
+        <p:txBody>
+          <a:bodyPr rot="0" spcFirstLastPara="0" vertOverflow="overflow" horzOverflow="overflow" vert="horz" wrap="square" lIns="72000" tIns="72000" rIns="72000" bIns="72000" numCol="1" spcCol="0" rtlCol="0" fromWordArt="0" anchor="ctr" anchorCtr="0" forceAA="0" compatLnSpc="1">
+            <a:prstTxWarp prst="textNoShape">
+              <a:avLst/>
+            </a:prstTxWarp>
+            <a:noAutofit/>
+          </a:bodyPr>
+          <a:lstStyle/>
+          <a:p>
+            <a:pPr algn="ctr">
+              <a:spcBef>
+                <a:spcPts val="200"/>
+              </a:spcBef>
+            </a:pPr>
+            <a:r>
+              <a:rPr lang="en-US" sz="1400" dirty="0"/>
+              <a:t>Sw3</a:t>
+            </a:r>
+          </a:p>
+        </p:txBody>
+      </p:sp>
+      <p:sp>
+        <p:nvSpPr>
+          <p:cNvPr id="12" name="Rectangle 11">
+            <a:extLst>
+              <a:ext uri="{FF2B5EF4-FFF2-40B4-BE49-F238E27FC236}">
+                <a16:creationId xmlns:a16="http://schemas.microsoft.com/office/drawing/2014/main" id="{51A5DD59-78F1-A5CB-15EF-21C358083E45}"/>
+              </a:ext>
+            </a:extLst>
+          </p:cNvPr>
+          <p:cNvSpPr/>
+          <p:nvPr/>
+        </p:nvSpPr>
+        <p:spPr>
+          <a:xfrm>
+            <a:off x="9624767" y="2450970"/>
+            <a:ext cx="1310326" cy="182249"/>
+          </a:xfrm>
+          <a:prstGeom prst="rect">
+            <a:avLst/>
+          </a:prstGeom>
+          <a:solidFill>
+            <a:schemeClr val="accent4"/>
+          </a:solidFill>
+          <a:ln>
+            <a:noFill/>
+          </a:ln>
+        </p:spPr>
+        <p:style>
+          <a:lnRef idx="2">
+            <a:schemeClr val="accent1">
+              <a:shade val="50000"/>
+            </a:schemeClr>
+          </a:lnRef>
+          <a:fillRef idx="1">
+            <a:schemeClr val="accent1"/>
+          </a:fillRef>
+          <a:effectRef idx="0">
+            <a:schemeClr val="accent1"/>
+          </a:effectRef>
+          <a:fontRef idx="minor">
+            <a:schemeClr val="lt1"/>
+          </a:fontRef>
+        </p:style>
+        <p:txBody>
+          <a:bodyPr rot="0" spcFirstLastPara="0" vertOverflow="overflow" horzOverflow="overflow" vert="horz" wrap="square" lIns="72000" tIns="72000" rIns="72000" bIns="72000" numCol="1" spcCol="0" rtlCol="0" fromWordArt="0" anchor="ctr" anchorCtr="0" forceAA="0" compatLnSpc="1">
+            <a:prstTxWarp prst="textNoShape">
+              <a:avLst/>
+            </a:prstTxWarp>
+            <a:noAutofit/>
+          </a:bodyPr>
+          <a:lstStyle/>
+          <a:p>
+            <a:pPr algn="ctr">
+              <a:spcBef>
+                <a:spcPts val="200"/>
+              </a:spcBef>
+            </a:pPr>
+            <a:r>
+              <a:rPr lang="en-US" sz="1400" dirty="0"/>
+              <a:t>Sw4</a:t>
+            </a:r>
+          </a:p>
+        </p:txBody>
+      </p:sp>
+      <p:sp>
+        <p:nvSpPr>
+          <p:cNvPr id="13" name="Rectangle 12">
+            <a:extLst>
+              <a:ext uri="{FF2B5EF4-FFF2-40B4-BE49-F238E27FC236}">
+                <a16:creationId xmlns:a16="http://schemas.microsoft.com/office/drawing/2014/main" id="{856BAAFB-D881-9361-090C-581BE223F77D}"/>
+              </a:ext>
+            </a:extLst>
+          </p:cNvPr>
+          <p:cNvSpPr/>
+          <p:nvPr/>
+        </p:nvSpPr>
+        <p:spPr>
+          <a:xfrm>
+            <a:off x="9548223" y="4152911"/>
+            <a:ext cx="1463414" cy="953279"/>
+          </a:xfrm>
+          <a:prstGeom prst="rect">
+            <a:avLst/>
+          </a:prstGeom>
+          <a:solidFill>
+            <a:schemeClr val="accent2"/>
+          </a:solidFill>
+          <a:ln>
+            <a:noFill/>
+          </a:ln>
+        </p:spPr>
+        <p:style>
+          <a:lnRef idx="0">
+            <a:scrgbClr r="0" g="0" b="0"/>
+          </a:lnRef>
+          <a:fillRef idx="0">
+            <a:scrgbClr r="0" g="0" b="0"/>
+          </a:fillRef>
+          <a:effectRef idx="0">
+            <a:scrgbClr r="0" g="0" b="0"/>
+          </a:effectRef>
+          <a:fontRef idx="minor">
+            <a:schemeClr val="lt1"/>
+          </a:fontRef>
+        </p:style>
+        <p:txBody>
+          <a:bodyPr rot="0" spcFirstLastPara="0" vertOverflow="overflow" horzOverflow="overflow" vert="horz" wrap="square" lIns="72000" tIns="72000" rIns="72000" bIns="72000" numCol="1" spcCol="0" rtlCol="0" fromWordArt="0" anchor="ctr" anchorCtr="0" forceAA="0" compatLnSpc="1">
+            <a:prstTxWarp prst="textNoShape">
+              <a:avLst/>
+            </a:prstTxWarp>
+            <a:noAutofit/>
+          </a:bodyPr>
+          <a:lstStyle/>
+          <a:p>
+            <a:pPr marL="180975" indent="-180975" algn="ctr">
+              <a:spcBef>
+                <a:spcPts val="200"/>
+              </a:spcBef>
+              <a:buFont typeface="Calibri" panose="020F0502020204030204" pitchFamily="34" charset="0"/>
+              <a:buChar char="▪"/>
+            </a:pPr>
+            <a:r>
+              <a:rPr lang="en-US" sz="1400" dirty="0"/>
+              <a:t>SD Card</a:t>
+            </a:r>
+          </a:p>
+        </p:txBody>
+      </p:sp>
+      <p:sp>
+        <p:nvSpPr>
+          <p:cNvPr id="14" name="Rectangle 13">
+            <a:extLst>
+              <a:ext uri="{FF2B5EF4-FFF2-40B4-BE49-F238E27FC236}">
+                <a16:creationId xmlns:a16="http://schemas.microsoft.com/office/drawing/2014/main" id="{09AD8F09-64DE-5A42-164C-05FB572040F2}"/>
+              </a:ext>
+            </a:extLst>
+          </p:cNvPr>
+          <p:cNvSpPr/>
+          <p:nvPr/>
+        </p:nvSpPr>
+        <p:spPr>
+          <a:xfrm>
+            <a:off x="9624768" y="3901043"/>
+            <a:ext cx="1310325" cy="231440"/>
+          </a:xfrm>
+          <a:prstGeom prst="rect">
+            <a:avLst/>
+          </a:prstGeom>
+          <a:solidFill>
+            <a:schemeClr val="accent2"/>
+          </a:solidFill>
+          <a:ln>
+            <a:noFill/>
+          </a:ln>
+        </p:spPr>
+        <p:style>
+          <a:lnRef idx="2">
+            <a:schemeClr val="accent1">
+              <a:shade val="50000"/>
+            </a:schemeClr>
+          </a:lnRef>
+          <a:fillRef idx="1">
+            <a:schemeClr val="accent1"/>
+          </a:fillRef>
+          <a:effectRef idx="0">
+            <a:schemeClr val="accent1"/>
+          </a:effectRef>
+          <a:fontRef idx="minor">
+            <a:schemeClr val="lt1"/>
+          </a:fontRef>
+        </p:style>
+        <p:txBody>
+          <a:bodyPr rot="0" spcFirstLastPara="0" vertOverflow="overflow" horzOverflow="overflow" vert="horz" wrap="square" lIns="72000" tIns="72000" rIns="72000" bIns="72000" numCol="1" spcCol="0" rtlCol="0" fromWordArt="0" anchor="ctr" anchorCtr="0" forceAA="0" compatLnSpc="1">
+            <a:prstTxWarp prst="textNoShape">
+              <a:avLst/>
+            </a:prstTxWarp>
+            <a:noAutofit/>
+          </a:bodyPr>
+          <a:lstStyle/>
+          <a:p>
+            <a:pPr marL="180975" indent="-180975" algn="ctr">
+              <a:spcBef>
+                <a:spcPts val="200"/>
+              </a:spcBef>
+              <a:buFont typeface="Calibri" panose="020F0502020204030204" pitchFamily="34" charset="0"/>
+              <a:buChar char="▪"/>
+            </a:pPr>
+            <a:r>
+              <a:rPr lang="en-US" sz="1400" dirty="0"/>
+              <a:t>Encoder SW</a:t>
             </a:r>
           </a:p>
         </p:txBody>

</xml_diff>